<commit_message>
Create function of app 12 added
</commit_message>
<xml_diff>
--- a/Presentations/UI5_005.pptx
+++ b/Presentations/UI5_005.pptx
@@ -199,7 +199,7 @@
           <a:p>
             <a:fld id="{75F5B6A6-A5EC-474C-9974-408E57F2AD69}" type="datetimeFigureOut">
               <a:rPr lang="en-US" smtClean="0"/>
-              <a:t>2019-09-17</a:t>
+              <a:t>2019-09-18</a:t>
             </a:fld>
             <a:endParaRPr lang="en-US"/>
           </a:p>
@@ -11714,7 +11714,7 @@
                 <a:cs typeface="Arial"/>
                 <a:sym typeface="Arial"/>
               </a:rPr>
-              <a:t>Lesson #4</a:t>
+              <a:t>Lesson #5</a:t>
             </a:r>
           </a:p>
         </p:txBody>
@@ -12436,7 +12436,7 @@
         <p:spPr>
           <a:xfrm>
             <a:off x="152394" y="1023179"/>
-            <a:ext cx="5548609" cy="5596282"/>
+            <a:ext cx="5294249" cy="5596282"/>
           </a:xfrm>
         </p:spPr>
         <p:txBody>
@@ -12447,36 +12447,86 @@
           <a:p>
             <a:r>
               <a:rPr lang="en-US" dirty="0"/>
-              <a:t>Sort</a:t>
+              <a:t>Create or download mock data</a:t>
+            </a:r>
+          </a:p>
+          <a:p>
+            <a:r>
+              <a:rPr lang="en-US" sz="2400" dirty="0"/>
+              <a:t>Initialize mock server</a:t>
+            </a:r>
+          </a:p>
+          <a:p>
+            <a:r>
+              <a:rPr lang="en-US" sz="2400" dirty="0"/>
+              <a:t>Create, Update, Delete</a:t>
+            </a:r>
+          </a:p>
+          <a:p>
+            <a:r>
+              <a:rPr lang="en-US" sz="2400" dirty="0">
+                <a:hlinkClick r:id="rId3"/>
+              </a:rPr>
+              <a:t>Deeper look at </a:t>
+            </a:r>
+            <a:r>
+              <a:rPr lang="en-US" sz="2400" dirty="0" err="1">
+                <a:hlinkClick r:id="rId3"/>
+              </a:rPr>
+              <a:t>ODataModel</a:t>
+            </a:r>
+            <a:r>
+              <a:rPr lang="en-US" sz="2400" dirty="0">
+                <a:hlinkClick r:id="rId3"/>
+              </a:rPr>
+              <a:t> </a:t>
             </a:r>
             <a:endParaRPr lang="en-US" sz="2400" dirty="0"/>
           </a:p>
           <a:p>
-            <a:pPr>
-              <a:buFont typeface="Wingdings" panose="05000000000000000000" pitchFamily="2" charset="2"/>
-              <a:buChar char="§"/>
-            </a:pPr>
-            <a:endParaRPr lang="en-US" sz="2200" dirty="0">
-              <a:solidFill>
-                <a:schemeClr val="accent1">
-                  <a:lumMod val="60000"/>
-                  <a:lumOff val="40000"/>
-                </a:schemeClr>
-              </a:solidFill>
-            </a:endParaRPr>
-          </a:p>
-          <a:p>
-            <a:pPr lvl="1">
-              <a:buFont typeface="Wingdings" panose="05000000000000000000" pitchFamily="2" charset="2"/>
-              <a:buChar char="§"/>
-            </a:pPr>
-            <a:endParaRPr lang="en-US" sz="1800" dirty="0"/>
-          </a:p>
-          <a:p>
-            <a:endParaRPr lang="en-US" dirty="0"/>
+            <a:r>
+              <a:rPr lang="en-US" dirty="0"/>
+              <a:t>Extract data from metadata</a:t>
+            </a:r>
           </a:p>
         </p:txBody>
       </p:sp>
+      <p:pic>
+        <p:nvPicPr>
+          <p:cNvPr id="5" name="Picture 4" descr="A screenshot of a computer&#10;&#10;Description automatically generated">
+            <a:extLst>
+              <a:ext uri="{FF2B5EF4-FFF2-40B4-BE49-F238E27FC236}">
+                <a16:creationId xmlns:a16="http://schemas.microsoft.com/office/drawing/2014/main" id="{AB13145B-1F72-498E-A909-7AB640BDD485}"/>
+              </a:ext>
+            </a:extLst>
+          </p:cNvPr>
+          <p:cNvPicPr>
+            <a:picLocks noChangeAspect="1"/>
+          </p:cNvPicPr>
+          <p:nvPr/>
+        </p:nvPicPr>
+        <p:blipFill>
+          <a:blip r:embed="rId4">
+            <a:extLst>
+              <a:ext uri="{28A0092B-C50C-407E-A947-70E740481C1C}">
+                <a14:useLocalDpi xmlns:a14="http://schemas.microsoft.com/office/drawing/2010/main" val="0"/>
+              </a:ext>
+            </a:extLst>
+          </a:blip>
+          <a:stretch>
+            <a:fillRect/>
+          </a:stretch>
+        </p:blipFill>
+        <p:spPr>
+          <a:xfrm>
+            <a:off x="5546035" y="556541"/>
+            <a:ext cx="4406857" cy="6301459"/>
+          </a:xfrm>
+          <a:prstGeom prst="rect">
+            <a:avLst/>
+          </a:prstGeom>
+        </p:spPr>
+      </p:pic>
     </p:spTree>
     <p:extLst>
       <p:ext uri="{BB962C8B-B14F-4D97-AF65-F5344CB8AC3E}">

</xml_diff>